<commit_message>
update samsung store doc
</commit_message>
<xml_diff>
--- a/docs/App_Description_for_samsung_eng_v.1.42-2.pptx
+++ b/docs/App_Description_for_samsung_eng_v.1.42-2.pptx
@@ -293,7 +293,7 @@
             <a:fld id="{D98953DA-782A-48AA-87CE-00BCEE572E43}" type="datetimeFigureOut">
               <a:rPr lang="ko-KR" altLang="en-US" smtClean="0"/>
               <a:pPr/>
-              <a:t>2/2/15</a:t>
+              <a:t>2/24/15</a:t>
             </a:fld>
             <a:endParaRPr lang="ko-KR" altLang="en-US"/>
           </a:p>
@@ -460,7 +460,7 @@
             <a:fld id="{D98953DA-782A-48AA-87CE-00BCEE572E43}" type="datetimeFigureOut">
               <a:rPr lang="ko-KR" altLang="en-US" smtClean="0"/>
               <a:pPr/>
-              <a:t>2/2/15</a:t>
+              <a:t>2/24/15</a:t>
             </a:fld>
             <a:endParaRPr lang="ko-KR" altLang="en-US"/>
           </a:p>
@@ -637,7 +637,7 @@
             <a:fld id="{D98953DA-782A-48AA-87CE-00BCEE572E43}" type="datetimeFigureOut">
               <a:rPr lang="ko-KR" altLang="en-US" smtClean="0"/>
               <a:pPr/>
-              <a:t>2/2/15</a:t>
+              <a:t>2/24/15</a:t>
             </a:fld>
             <a:endParaRPr lang="ko-KR" altLang="en-US"/>
           </a:p>
@@ -804,7 +804,7 @@
             <a:fld id="{D98953DA-782A-48AA-87CE-00BCEE572E43}" type="datetimeFigureOut">
               <a:rPr lang="ko-KR" altLang="en-US" smtClean="0"/>
               <a:pPr/>
-              <a:t>2/2/15</a:t>
+              <a:t>2/24/15</a:t>
             </a:fld>
             <a:endParaRPr lang="ko-KR" altLang="en-US"/>
           </a:p>
@@ -1048,7 +1048,7 @@
             <a:fld id="{D98953DA-782A-48AA-87CE-00BCEE572E43}" type="datetimeFigureOut">
               <a:rPr lang="ko-KR" altLang="en-US" smtClean="0"/>
               <a:pPr/>
-              <a:t>2/2/15</a:t>
+              <a:t>2/24/15</a:t>
             </a:fld>
             <a:endParaRPr lang="ko-KR" altLang="en-US"/>
           </a:p>
@@ -1314,7 +1314,7 @@
             <a:fld id="{D98953DA-782A-48AA-87CE-00BCEE572E43}" type="datetimeFigureOut">
               <a:rPr lang="ko-KR" altLang="en-US" smtClean="0"/>
               <a:pPr/>
-              <a:t>2/2/15</a:t>
+              <a:t>2/24/15</a:t>
             </a:fld>
             <a:endParaRPr lang="ko-KR" altLang="en-US"/>
           </a:p>
@@ -1694,7 +1694,7 @@
             <a:fld id="{D98953DA-782A-48AA-87CE-00BCEE572E43}" type="datetimeFigureOut">
               <a:rPr lang="ko-KR" altLang="en-US" smtClean="0"/>
               <a:pPr/>
-              <a:t>2/2/15</a:t>
+              <a:t>2/24/15</a:t>
             </a:fld>
             <a:endParaRPr lang="ko-KR" altLang="en-US"/>
           </a:p>
@@ -1846,7 +1846,7 @@
             <a:fld id="{D98953DA-782A-48AA-87CE-00BCEE572E43}" type="datetimeFigureOut">
               <a:rPr lang="ko-KR" altLang="en-US" smtClean="0"/>
               <a:pPr/>
-              <a:t>2/2/15</a:t>
+              <a:t>2/24/15</a:t>
             </a:fld>
             <a:endParaRPr lang="ko-KR" altLang="en-US"/>
           </a:p>
@@ -1938,7 +1938,7 @@
             <a:fld id="{D98953DA-782A-48AA-87CE-00BCEE572E43}" type="datetimeFigureOut">
               <a:rPr lang="ko-KR" altLang="en-US" smtClean="0"/>
               <a:pPr/>
-              <a:t>2/2/15</a:t>
+              <a:t>2/24/15</a:t>
             </a:fld>
             <a:endParaRPr lang="ko-KR" altLang="en-US"/>
           </a:p>
@@ -2201,7 +2201,7 @@
             <a:fld id="{D98953DA-782A-48AA-87CE-00BCEE572E43}" type="datetimeFigureOut">
               <a:rPr lang="ko-KR" altLang="en-US" smtClean="0"/>
               <a:pPr/>
-              <a:t>2/2/15</a:t>
+              <a:t>2/24/15</a:t>
             </a:fld>
             <a:endParaRPr lang="ko-KR" altLang="en-US"/>
           </a:p>
@@ -2491,7 +2491,7 @@
             <a:fld id="{D98953DA-782A-48AA-87CE-00BCEE572E43}" type="datetimeFigureOut">
               <a:rPr lang="ko-KR" altLang="en-US" smtClean="0"/>
               <a:pPr/>
-              <a:t>2/2/15</a:t>
+              <a:t>2/24/15</a:t>
             </a:fld>
             <a:endParaRPr lang="ko-KR" altLang="en-US"/>
           </a:p>
@@ -3264,7 +3264,7 @@
             <a:fld id="{D98953DA-782A-48AA-87CE-00BCEE572E43}" type="datetimeFigureOut">
               <a:rPr lang="ko-KR" altLang="en-US" smtClean="0"/>
               <a:pPr/>
-              <a:t>2/2/15</a:t>
+              <a:t>2/24/15</a:t>
             </a:fld>
             <a:endParaRPr lang="ko-KR" altLang="en-US"/>
           </a:p>
@@ -4438,25 +4438,8 @@
                   </a:schemeClr>
                 </a:solidFill>
               </a:rPr>
-              <a:t>Menu&amp; function description with screen </a:t>
-            </a:r>
-            <a:r>
-              <a:rPr lang="en-US" altLang="ko-KR" i="1" dirty="0" smtClean="0">
-                <a:solidFill>
-                  <a:schemeClr val="accent5">
-                    <a:lumMod val="75000"/>
-                  </a:schemeClr>
-                </a:solidFill>
-              </a:rPr>
-              <a:t>shot</a:t>
-            </a:r>
-            <a:endParaRPr lang="en-US" altLang="ko-KR" i="1" dirty="0" smtClean="0">
-              <a:solidFill>
-                <a:schemeClr val="accent5">
-                  <a:lumMod val="75000"/>
-                </a:schemeClr>
-              </a:solidFill>
-            </a:endParaRPr>
+              <a:t>Menu&amp; function description with screen shot</a:t>
+            </a:r>
           </a:p>
         </p:txBody>
       </p:sp>
@@ -6518,33 +6501,8 @@
                           <a:latin typeface="Century Gothic" pitchFamily="34" charset="0"/>
                           <a:ea typeface="돋움" pitchFamily="50" charset="-127"/>
                         </a:rPr>
-                        <a:t>Move to previous </a:t>
+                        <a:t>Move to previous screen</a:t>
                       </a:r>
-                      <a:r>
-                        <a:rPr kumimoji="1" lang="en-US" altLang="ko-KR" sz="1100" b="1" i="0" u="none" strike="noStrike" cap="none" normalizeH="0" baseline="0" dirty="0" smtClean="0">
-                          <a:ln>
-                            <a:noFill/>
-                          </a:ln>
-                          <a:solidFill>
-                            <a:srgbClr val="FF0000"/>
-                          </a:solidFill>
-                          <a:effectLst/>
-                          <a:latin typeface="Century Gothic" pitchFamily="34" charset="0"/>
-                          <a:ea typeface="돋움" pitchFamily="50" charset="-127"/>
-                        </a:rPr>
-                        <a:t>screen</a:t>
-                      </a:r>
-                      <a:endParaRPr kumimoji="1" lang="en-US" altLang="ko-KR" sz="1100" b="1" i="0" u="none" strike="noStrike" cap="none" normalizeH="0" baseline="0" dirty="0" smtClean="0">
-                        <a:ln>
-                          <a:noFill/>
-                        </a:ln>
-                        <a:solidFill>
-                          <a:srgbClr val="FF0000"/>
-                        </a:solidFill>
-                        <a:effectLst/>
-                        <a:latin typeface="Century Gothic" pitchFamily="34" charset="0"/>
-                        <a:ea typeface="돋움" pitchFamily="50" charset="-127"/>
-                      </a:endParaRPr>
                     </a:p>
                   </a:txBody>
                   <a:tcPr marL="36000" marR="36000" marT="36000" marB="36000" horzOverflow="overflow">
@@ -7452,14 +7410,14 @@
             <p:ph idx="1"/>
             <p:extLst>
               <p:ext uri="{D42A27DB-BD31-4B8C-83A1-F6EECF244321}">
-                <p14:modId xmlns:p14="http://schemas.microsoft.com/office/powerpoint/2010/main" val="1381276400"/>
+                <p14:modId xmlns:p14="http://schemas.microsoft.com/office/powerpoint/2010/main" val="1534220679"/>
               </p:ext>
             </p:extLst>
           </p:nvPr>
         </p:nvGraphicFramePr>
         <p:xfrm>
           <a:off x="457200" y="1935163"/>
-          <a:ext cx="8229600" cy="1112520"/>
+          <a:ext cx="8229600" cy="1381760"/>
         </p:xfrm>
         <a:graphic>
           <a:graphicData uri="http://schemas.openxmlformats.org/drawingml/2006/table">
@@ -7550,7 +7508,7 @@
                             </a:schemeClr>
                           </a:solidFill>
                         </a:rPr>
-                        <a:t>1.0</a:t>
+                        <a:t>1.0.0</a:t>
                       </a:r>
                       <a:endParaRPr lang="ko-KR" altLang="en-US" i="1" dirty="0">
                         <a:solidFill>
@@ -7655,6 +7613,10 @@
                     <a:lstStyle/>
                     <a:p>
                       <a:pPr latinLnBrk="1"/>
+                      <a:r>
+                        <a:rPr lang="en-US" altLang="ko-KR" dirty="0" smtClean="0"/>
+                        <a:t>1.0.1</a:t>
+                      </a:r>
                       <a:endParaRPr lang="ko-KR" altLang="en-US" dirty="0"/>
                     </a:p>
                   </a:txBody>
@@ -7666,7 +7628,11 @@
                     <a:lstStyle/>
                     <a:p>
                       <a:pPr latinLnBrk="1"/>
-                      <a:endParaRPr lang="ko-KR" altLang="en-US"/>
+                      <a:r>
+                        <a:rPr lang="en-US" altLang="ko-KR" i="1" dirty="0" smtClean="0"/>
+                        <a:t>2015.02.24</a:t>
+                      </a:r>
+                      <a:endParaRPr lang="ko-KR" altLang="en-US" i="1" dirty="0"/>
                     </a:p>
                   </a:txBody>
                   <a:tcPr/>
@@ -7677,7 +7643,22 @@
                     <a:lstStyle/>
                     <a:p>
                       <a:pPr latinLnBrk="1"/>
-                      <a:endParaRPr lang="ko-KR" altLang="en-US"/>
+                      <a:r>
+                        <a:rPr lang="en-US" altLang="ko-KR" dirty="0" smtClean="0"/>
+                        <a:t>Fix all bugs</a:t>
+                      </a:r>
+                      <a:r>
+                        <a:rPr lang="en-US" altLang="ko-KR" baseline="0" dirty="0" smtClean="0"/>
+                        <a:t> found during Samsung </a:t>
+                      </a:r>
+                    </a:p>
+                    <a:p>
+                      <a:pPr latinLnBrk="1"/>
+                      <a:r>
+                        <a:rPr lang="en-US" altLang="ko-KR" baseline="0" dirty="0" smtClean="0"/>
+                        <a:t>app store’s review process</a:t>
+                      </a:r>
+                      <a:endParaRPr lang="ko-KR" altLang="en-US" dirty="0"/>
                     </a:p>
                   </a:txBody>
                   <a:tcPr/>
@@ -7688,6 +7669,10 @@
                     <a:lstStyle/>
                     <a:p>
                       <a:pPr latinLnBrk="1"/>
+                      <a:r>
+                        <a:rPr lang="en-US" altLang="ko-KR" dirty="0" err="1" smtClean="0"/>
+                        <a:t>OrangeeTV</a:t>
+                      </a:r>
                       <a:endParaRPr lang="ko-KR" altLang="en-US" dirty="0"/>
                     </a:p>
                   </a:txBody>
@@ -7865,7 +7850,6 @@
               <a:rPr lang="en-US" altLang="ko-KR" dirty="0" smtClean="0"/>
               <a:t>There are three types of screens in this app:</a:t>
             </a:r>
-            <a:endParaRPr lang="en-US" altLang="ko-KR" dirty="0" smtClean="0"/>
           </a:p>
           <a:p>
             <a:pPr lvl="1"/>
@@ -8379,27 +8363,7 @@
                   </a:schemeClr>
                 </a:solidFill>
               </a:rPr>
-              <a:t>– </a:t>
-            </a:r>
-            <a:r>
-              <a:rPr lang="en-US" altLang="ko-KR" i="1" dirty="0" smtClean="0">
-                <a:solidFill>
-                  <a:schemeClr val="accent5">
-                    <a:lumMod val="75000"/>
-                  </a:schemeClr>
-                </a:solidFill>
-              </a:rPr>
-              <a:t>(</a:t>
-            </a:r>
-            <a:r>
-              <a:rPr lang="en-US" altLang="ko-KR" i="1" dirty="0" smtClean="0">
-                <a:solidFill>
-                  <a:schemeClr val="accent5">
-                    <a:lumMod val="75000"/>
-                  </a:schemeClr>
-                </a:solidFill>
-              </a:rPr>
-              <a:t>flow graph)</a:t>
+              <a:t>– (flow graph)</a:t>
             </a:r>
             <a:endParaRPr lang="ko-KR" altLang="en-US" i="1" dirty="0">
               <a:solidFill>

</xml_diff>